<commit_message>
variables and data structure
</commit_message>
<xml_diff>
--- a/java_programming_rules.pptx
+++ b/java_programming_rules.pptx
@@ -295,7 +295,7 @@
             <a:fld id="{EB893E94-F380-460C-A532-BF90D3B2BB66}" type="datetimeFigureOut">
               <a:rPr lang="en-US" smtClean="0"/>
               <a:pPr/>
-              <a:t>1/1/2023</a:t>
+              <a:t>1/3/2023</a:t>
             </a:fld>
             <a:endParaRPr lang="en-US"/>
           </a:p>
@@ -462,7 +462,7 @@
             <a:fld id="{EB893E94-F380-460C-A532-BF90D3B2BB66}" type="datetimeFigureOut">
               <a:rPr lang="en-US" smtClean="0"/>
               <a:pPr/>
-              <a:t>1/1/2023</a:t>
+              <a:t>1/3/2023</a:t>
             </a:fld>
             <a:endParaRPr lang="en-US"/>
           </a:p>
@@ -639,7 +639,7 @@
             <a:fld id="{EB893E94-F380-460C-A532-BF90D3B2BB66}" type="datetimeFigureOut">
               <a:rPr lang="en-US" smtClean="0"/>
               <a:pPr/>
-              <a:t>1/1/2023</a:t>
+              <a:t>1/3/2023</a:t>
             </a:fld>
             <a:endParaRPr lang="en-US"/>
           </a:p>
@@ -806,7 +806,7 @@
             <a:fld id="{EB893E94-F380-460C-A532-BF90D3B2BB66}" type="datetimeFigureOut">
               <a:rPr lang="en-US" smtClean="0"/>
               <a:pPr/>
-              <a:t>1/1/2023</a:t>
+              <a:t>1/3/2023</a:t>
             </a:fld>
             <a:endParaRPr lang="en-US"/>
           </a:p>
@@ -1049,7 +1049,7 @@
             <a:fld id="{EB893E94-F380-460C-A532-BF90D3B2BB66}" type="datetimeFigureOut">
               <a:rPr lang="en-US" smtClean="0"/>
               <a:pPr/>
-              <a:t>1/1/2023</a:t>
+              <a:t>1/3/2023</a:t>
             </a:fld>
             <a:endParaRPr lang="en-US"/>
           </a:p>
@@ -1334,7 +1334,7 @@
             <a:fld id="{EB893E94-F380-460C-A532-BF90D3B2BB66}" type="datetimeFigureOut">
               <a:rPr lang="en-US" smtClean="0"/>
               <a:pPr/>
-              <a:t>1/1/2023</a:t>
+              <a:t>1/3/2023</a:t>
             </a:fld>
             <a:endParaRPr lang="en-US"/>
           </a:p>
@@ -1753,7 +1753,7 @@
             <a:fld id="{EB893E94-F380-460C-A532-BF90D3B2BB66}" type="datetimeFigureOut">
               <a:rPr lang="en-US" smtClean="0"/>
               <a:pPr/>
-              <a:t>1/1/2023</a:t>
+              <a:t>1/3/2023</a:t>
             </a:fld>
             <a:endParaRPr lang="en-US"/>
           </a:p>
@@ -1868,7 +1868,7 @@
             <a:fld id="{EB893E94-F380-460C-A532-BF90D3B2BB66}" type="datetimeFigureOut">
               <a:rPr lang="en-US" smtClean="0"/>
               <a:pPr/>
-              <a:t>1/1/2023</a:t>
+              <a:t>1/3/2023</a:t>
             </a:fld>
             <a:endParaRPr lang="en-US"/>
           </a:p>
@@ -1960,7 +1960,7 @@
             <a:fld id="{EB893E94-F380-460C-A532-BF90D3B2BB66}" type="datetimeFigureOut">
               <a:rPr lang="en-US" smtClean="0"/>
               <a:pPr/>
-              <a:t>1/1/2023</a:t>
+              <a:t>1/3/2023</a:t>
             </a:fld>
             <a:endParaRPr lang="en-US"/>
           </a:p>
@@ -2234,7 +2234,7 @@
             <a:fld id="{EB893E94-F380-460C-A532-BF90D3B2BB66}" type="datetimeFigureOut">
               <a:rPr lang="en-US" smtClean="0"/>
               <a:pPr/>
-              <a:t>1/1/2023</a:t>
+              <a:t>1/3/2023</a:t>
             </a:fld>
             <a:endParaRPr lang="en-US"/>
           </a:p>
@@ -2484,7 +2484,7 @@
             <a:fld id="{EB893E94-F380-460C-A532-BF90D3B2BB66}" type="datetimeFigureOut">
               <a:rPr lang="en-US" smtClean="0"/>
               <a:pPr/>
-              <a:t>1/1/2023</a:t>
+              <a:t>1/3/2023</a:t>
             </a:fld>
             <a:endParaRPr lang="en-US"/>
           </a:p>
@@ -2694,7 +2694,7 @@
             <a:fld id="{EB893E94-F380-460C-A532-BF90D3B2BB66}" type="datetimeFigureOut">
               <a:rPr lang="en-US" smtClean="0"/>
               <a:pPr/>
-              <a:t>1/1/2023</a:t>
+              <a:t>1/3/2023</a:t>
             </a:fld>
             <a:endParaRPr lang="en-US"/>
           </a:p>
@@ -3137,12 +3137,20 @@
               <a:buChar char="•"/>
             </a:pPr>
             <a:r>
+              <a:rPr lang="en-US" sz="2000" b="1" smtClean="0">
+                <a:solidFill>
+                  <a:srgbClr val="2A00DA"/>
+                </a:solidFill>
+              </a:rPr>
+              <a:t>Class/variable/method </a:t>
+            </a:r>
+            <a:r>
               <a:rPr lang="en-US" sz="2000" b="1" dirty="0" smtClean="0">
                 <a:solidFill>
                   <a:srgbClr val="2A00DA"/>
                 </a:solidFill>
               </a:rPr>
-              <a:t>Class name should match file name(without extension). Class name can contain alphabets, numbers , $ and _ symbol (no space)</a:t>
+              <a:t>name should match file name(without extension). Class name can contain alphabets, numbers , $ and _ symbol (no space)</a:t>
             </a:r>
           </a:p>
           <a:p>
@@ -3983,15 +3991,7 @@
             </a:pPr>
             <a:r>
               <a:rPr lang="en-US" dirty="0" smtClean="0"/>
-              <a:t>how </a:t>
-            </a:r>
-            <a:r>
-              <a:rPr lang="en-US" dirty="0" smtClean="0"/>
-              <a:t>to recognize methods : Does-A </a:t>
-            </a:r>
-            <a:r>
-              <a:rPr lang="en-US" dirty="0" smtClean="0"/>
-              <a:t>exercise</a:t>
+              <a:t>how to recognize methods : Does-A exercise</a:t>
             </a:r>
           </a:p>
           <a:p>
@@ -4023,11 +4023,6 @@
               </a:rPr>
               <a:t>addition</a:t>
             </a:r>
-            <a:endParaRPr lang="en-US" dirty="0" smtClean="0">
-              <a:solidFill>
-                <a:srgbClr val="FF0000"/>
-              </a:solidFill>
-            </a:endParaRPr>
           </a:p>
           <a:p>
             <a:pPr>
@@ -4036,11 +4031,7 @@
             </a:pPr>
             <a:r>
               <a:rPr lang="en-US" dirty="0" smtClean="0"/>
-              <a:t>how </a:t>
-            </a:r>
-            <a:r>
-              <a:rPr lang="en-US" dirty="0" smtClean="0"/>
-              <a:t>to code methods :</a:t>
+              <a:t>how to code methods :</a:t>
             </a:r>
           </a:p>
           <a:p>
@@ -4050,17 +4041,12 @@
             </a:pPr>
             <a:r>
               <a:rPr lang="en-US" dirty="0" smtClean="0"/>
-              <a:t>What </a:t>
-            </a:r>
-            <a:r>
-              <a:rPr lang="en-US" dirty="0" smtClean="0"/>
-              <a:t>to name this activity ???  </a:t>
+              <a:t>What to name this activity ???  </a:t>
             </a:r>
             <a:r>
               <a:rPr lang="en-US" b="1" dirty="0" smtClean="0"/>
               <a:t>addition</a:t>
             </a:r>
-            <a:endParaRPr lang="en-US" b="1" dirty="0" smtClean="0"/>
           </a:p>
           <a:p>
             <a:pPr lvl="1">
@@ -4069,13 +4055,8 @@
             </a:pPr>
             <a:r>
               <a:rPr lang="en-US" dirty="0" smtClean="0"/>
-              <a:t>how </a:t>
-            </a:r>
-            <a:r>
-              <a:rPr lang="en-US" dirty="0" smtClean="0"/>
-              <a:t>many inputs are required ??? what are the data type of each inputs ???  </a:t>
-            </a:r>
-            <a:endParaRPr lang="en-US" dirty="0" smtClean="0"/>
+              <a:t>how many inputs are required ??? what are the data type of each inputs ???  </a:t>
+            </a:r>
           </a:p>
           <a:p>
             <a:pPr lvl="2">
@@ -4104,15 +4085,7 @@
             </a:pPr>
             <a:r>
               <a:rPr lang="en-US" dirty="0" smtClean="0"/>
-              <a:t>If more than 1 input write pair of data </a:t>
-            </a:r>
-            <a:r>
-              <a:rPr lang="en-US" dirty="0" smtClean="0"/>
-              <a:t>type and input name(parameter</a:t>
-            </a:r>
-            <a:r>
-              <a:rPr lang="en-US" dirty="0" smtClean="0"/>
-              <a:t>) comma separated</a:t>
+              <a:t>If more than 1 input write pair of data type and input name(parameter) comma separated</a:t>
             </a:r>
           </a:p>
           <a:p>
@@ -4122,11 +4095,7 @@
             </a:pPr>
             <a:r>
               <a:rPr lang="en-US" dirty="0" smtClean="0"/>
-              <a:t>2 </a:t>
-            </a:r>
-            <a:r>
-              <a:rPr lang="en-US" dirty="0" smtClean="0"/>
-              <a:t>inputs, </a:t>
+              <a:t>2 inputs, </a:t>
             </a:r>
             <a:r>
               <a:rPr lang="en-US" b="1" dirty="0" err="1" smtClean="0"/>
@@ -4144,7 +4113,6 @@
               <a:rPr lang="en-US" b="1" dirty="0" smtClean="0"/>
               <a:t> number2</a:t>
             </a:r>
-            <a:endParaRPr lang="en-US" b="1" dirty="0" smtClean="0"/>
           </a:p>
           <a:p>
             <a:pPr lvl="1">
@@ -4153,21 +4121,8 @@
             </a:pPr>
             <a:r>
               <a:rPr lang="en-US" dirty="0" smtClean="0"/>
-              <a:t>how </a:t>
-            </a:r>
-            <a:r>
-              <a:rPr lang="en-US" dirty="0" smtClean="0"/>
-              <a:t>many </a:t>
-            </a:r>
-            <a:r>
-              <a:rPr lang="en-US" dirty="0" smtClean="0"/>
-              <a:t>returns/outputs </a:t>
-            </a:r>
-            <a:r>
-              <a:rPr lang="en-US" dirty="0" smtClean="0"/>
-              <a:t>are required ??? what is the data type of each output ???   </a:t>
-            </a:r>
-            <a:endParaRPr lang="en-US" dirty="0" smtClean="0"/>
+              <a:t>how many returns/outputs are required ??? what is the data type of each output ???   </a:t>
+            </a:r>
           </a:p>
           <a:p>
             <a:pPr lvl="2">
@@ -4206,11 +4161,7 @@
             </a:pPr>
             <a:r>
               <a:rPr lang="en-US" dirty="0" smtClean="0"/>
-              <a:t>1 </a:t>
-            </a:r>
-            <a:r>
-              <a:rPr lang="en-US" dirty="0" smtClean="0"/>
-              <a:t>output.. </a:t>
+              <a:t>1 output.. </a:t>
             </a:r>
             <a:r>
               <a:rPr lang="en-US" b="1" dirty="0" err="1" smtClean="0"/>
@@ -4357,11 +4308,7 @@
             </a:pPr>
             <a:r>
               <a:rPr lang="en-US" dirty="0" smtClean="0"/>
-              <a:t>if </a:t>
-            </a:r>
-            <a:r>
-              <a:rPr lang="en-US" dirty="0" smtClean="0"/>
-              <a:t>the output/return type is primitive or simple</a:t>
+              <a:t>if the output/return type is primitive or simple</a:t>
             </a:r>
           </a:p>
           <a:p>
@@ -4371,11 +4318,7 @@
             </a:pPr>
             <a:r>
               <a:rPr lang="en-US" dirty="0" smtClean="0"/>
-              <a:t>any </a:t>
-            </a:r>
-            <a:r>
-              <a:rPr lang="en-US" dirty="0" smtClean="0"/>
-              <a:t>variable of same type or any value of same data type can be returned</a:t>
+              <a:t>any variable of same type or any value of same data type can be returned</a:t>
             </a:r>
           </a:p>
           <a:p>
@@ -4395,13 +4338,8 @@
             </a:pPr>
             <a:r>
               <a:rPr lang="en-US" dirty="0" smtClean="0"/>
-              <a:t>any </a:t>
-            </a:r>
-            <a:r>
-              <a:rPr lang="en-US" dirty="0" smtClean="0"/>
-              <a:t>variable of same type or null value can be returned.</a:t>
-            </a:r>
-            <a:endParaRPr lang="en-US" dirty="0" smtClean="0"/>
+              <a:t>any variable of same type or null value can be returned.</a:t>
+            </a:r>
           </a:p>
         </p:txBody>
       </p:sp>
@@ -4532,17 +4470,8 @@
             </a:pPr>
             <a:r>
               <a:rPr lang="en-US" dirty="0" smtClean="0"/>
-              <a:t>number </a:t>
-            </a:r>
-            <a:r>
-              <a:rPr lang="en-US" dirty="0" smtClean="0"/>
-              <a:t>of input should </a:t>
-            </a:r>
-            <a:r>
-              <a:rPr lang="en-US" dirty="0" smtClean="0"/>
-              <a:t>match</a:t>
-            </a:r>
-            <a:endParaRPr lang="en-US" dirty="0" smtClean="0"/>
+              <a:t>number of input should match</a:t>
+            </a:r>
           </a:p>
           <a:p>
             <a:pPr lvl="1">
@@ -4551,17 +4480,8 @@
             </a:pPr>
             <a:r>
               <a:rPr lang="en-US" dirty="0" smtClean="0"/>
-              <a:t>data </a:t>
-            </a:r>
-            <a:r>
-              <a:rPr lang="en-US" dirty="0" smtClean="0"/>
-              <a:t>type of input should </a:t>
-            </a:r>
-            <a:r>
-              <a:rPr lang="en-US" dirty="0" smtClean="0"/>
-              <a:t>match</a:t>
-            </a:r>
-            <a:endParaRPr lang="en-US" dirty="0" smtClean="0"/>
+              <a:t>data type of input should match</a:t>
+            </a:r>
           </a:p>
           <a:p>
             <a:pPr lvl="1">
@@ -4570,11 +4490,7 @@
             </a:pPr>
             <a:r>
               <a:rPr lang="en-US" dirty="0" smtClean="0"/>
-              <a:t>order </a:t>
-            </a:r>
-            <a:r>
-              <a:rPr lang="en-US" dirty="0" smtClean="0"/>
-              <a:t>of input should match</a:t>
+              <a:t>order of input should match</a:t>
             </a:r>
           </a:p>
           <a:p>
@@ -4584,29 +4500,8 @@
             </a:pPr>
             <a:r>
               <a:rPr lang="en-US" dirty="0" smtClean="0"/>
-              <a:t>R</a:t>
-            </a:r>
-            <a:r>
-              <a:rPr lang="en-US" dirty="0" smtClean="0"/>
-              <a:t>eturn </a:t>
-            </a:r>
-            <a:r>
-              <a:rPr lang="en-US" dirty="0" smtClean="0"/>
-              <a:t>type </a:t>
-            </a:r>
-            <a:r>
-              <a:rPr lang="en-US" dirty="0" smtClean="0"/>
-              <a:t>from other program </a:t>
-            </a:r>
-            <a:r>
-              <a:rPr lang="en-US" dirty="0" smtClean="0"/>
-              <a:t>should match LHS </a:t>
-            </a:r>
-            <a:r>
-              <a:rPr lang="en-US" dirty="0" smtClean="0"/>
-              <a:t>variable</a:t>
-            </a:r>
-            <a:endParaRPr lang="en-US" dirty="0" smtClean="0"/>
+              <a:t>Return type from other program should match LHS variable</a:t>
+            </a:r>
           </a:p>
         </p:txBody>
       </p:sp>

</xml_diff>